<commit_message>
removed scripting part. we do that day2
</commit_message>
<xml_diff>
--- a/doc/slides/day1/session4/introBwaSamtools.pptx
+++ b/doc/slides/day1/session4/introBwaSamtools.pptx
@@ -5,7 +5,7 @@
     <p:sldMasterId id="2147483648" r:id="rId1"/>
   </p:sldMasterIdLst>
   <p:notesMasterIdLst>
-    <p:notesMasterId r:id="rId16"/>
+    <p:notesMasterId r:id="rId15"/>
   </p:notesMasterIdLst>
   <p:sldIdLst>
     <p:sldId id="270" r:id="rId2"/>
@@ -21,7 +21,6 @@
     <p:sldId id="266" r:id="rId12"/>
     <p:sldId id="267" r:id="rId13"/>
     <p:sldId id="268" r:id="rId14"/>
-    <p:sldId id="269" r:id="rId15"/>
   </p:sldIdLst>
   <p:sldSz cx="9144000" cy="6858000" type="screen4x3"/>
   <p:notesSz cx="6858000" cy="9144000"/>
@@ -206,7 +205,7 @@
             <a:fld id="{5AB5880A-C342-1143-831E-CB91D5241AEE}" type="datetimeFigureOut">
               <a:rPr lang="en-US" smtClean="0"/>
               <a:pPr/>
-              <a:t>10/18/13</a:t>
+              <a:t>10/21/13</a:t>
             </a:fld>
             <a:endParaRPr lang="en-US"/>
           </a:p>
@@ -753,7 +752,7 @@
             <a:fld id="{31F01D4E-5470-D54A-988D-EBB274F3F401}" type="datetimeFigureOut">
               <a:rPr lang="en-US" smtClean="0"/>
               <a:pPr/>
-              <a:t>10/18/13</a:t>
+              <a:t>10/21/13</a:t>
             </a:fld>
             <a:endParaRPr lang="en-US"/>
           </a:p>
@@ -920,7 +919,7 @@
             <a:fld id="{31F01D4E-5470-D54A-988D-EBB274F3F401}" type="datetimeFigureOut">
               <a:rPr lang="en-US" smtClean="0"/>
               <a:pPr/>
-              <a:t>10/18/13</a:t>
+              <a:t>10/21/13</a:t>
             </a:fld>
             <a:endParaRPr lang="en-US"/>
           </a:p>
@@ -1097,7 +1096,7 @@
             <a:fld id="{31F01D4E-5470-D54A-988D-EBB274F3F401}" type="datetimeFigureOut">
               <a:rPr lang="en-US" smtClean="0"/>
               <a:pPr/>
-              <a:t>10/18/13</a:t>
+              <a:t>10/21/13</a:t>
             </a:fld>
             <a:endParaRPr lang="en-US"/>
           </a:p>
@@ -1264,7 +1263,7 @@
             <a:fld id="{31F01D4E-5470-D54A-988D-EBB274F3F401}" type="datetimeFigureOut">
               <a:rPr lang="en-US" smtClean="0"/>
               <a:pPr/>
-              <a:t>10/18/13</a:t>
+              <a:t>10/21/13</a:t>
             </a:fld>
             <a:endParaRPr lang="en-US"/>
           </a:p>
@@ -1507,7 +1506,7 @@
             <a:fld id="{31F01D4E-5470-D54A-988D-EBB274F3F401}" type="datetimeFigureOut">
               <a:rPr lang="en-US" smtClean="0"/>
               <a:pPr/>
-              <a:t>10/18/13</a:t>
+              <a:t>10/21/13</a:t>
             </a:fld>
             <a:endParaRPr lang="en-US"/>
           </a:p>
@@ -1792,7 +1791,7 @@
             <a:fld id="{31F01D4E-5470-D54A-988D-EBB274F3F401}" type="datetimeFigureOut">
               <a:rPr lang="en-US" smtClean="0"/>
               <a:pPr/>
-              <a:t>10/18/13</a:t>
+              <a:t>10/21/13</a:t>
             </a:fld>
             <a:endParaRPr lang="en-US"/>
           </a:p>
@@ -2211,7 +2210,7 @@
             <a:fld id="{31F01D4E-5470-D54A-988D-EBB274F3F401}" type="datetimeFigureOut">
               <a:rPr lang="en-US" smtClean="0"/>
               <a:pPr/>
-              <a:t>10/18/13</a:t>
+              <a:t>10/21/13</a:t>
             </a:fld>
             <a:endParaRPr lang="en-US"/>
           </a:p>
@@ -2326,7 +2325,7 @@
             <a:fld id="{31F01D4E-5470-D54A-988D-EBB274F3F401}" type="datetimeFigureOut">
               <a:rPr lang="en-US" smtClean="0"/>
               <a:pPr/>
-              <a:t>10/18/13</a:t>
+              <a:t>10/21/13</a:t>
             </a:fld>
             <a:endParaRPr lang="en-US"/>
           </a:p>
@@ -2418,7 +2417,7 @@
             <a:fld id="{31F01D4E-5470-D54A-988D-EBB274F3F401}" type="datetimeFigureOut">
               <a:rPr lang="en-US" smtClean="0"/>
               <a:pPr/>
-              <a:t>10/18/13</a:t>
+              <a:t>10/21/13</a:t>
             </a:fld>
             <a:endParaRPr lang="en-US"/>
           </a:p>
@@ -2692,7 +2691,7 @@
             <a:fld id="{31F01D4E-5470-D54A-988D-EBB274F3F401}" type="datetimeFigureOut">
               <a:rPr lang="en-US" smtClean="0"/>
               <a:pPr/>
-              <a:t>10/18/13</a:t>
+              <a:t>10/21/13</a:t>
             </a:fld>
             <a:endParaRPr lang="en-US"/>
           </a:p>
@@ -2942,7 +2941,7 @@
             <a:fld id="{31F01D4E-5470-D54A-988D-EBB274F3F401}" type="datetimeFigureOut">
               <a:rPr lang="en-US" smtClean="0"/>
               <a:pPr/>
-              <a:t>10/18/13</a:t>
+              <a:t>10/21/13</a:t>
             </a:fld>
             <a:endParaRPr lang="en-US"/>
           </a:p>
@@ -3152,7 +3151,7 @@
             <a:fld id="{31F01D4E-5470-D54A-988D-EBB274F3F401}" type="datetimeFigureOut">
               <a:rPr lang="en-US" smtClean="0"/>
               <a:pPr/>
-              <a:t>10/18/13</a:t>
+              <a:t>10/21/13</a:t>
             </a:fld>
             <a:endParaRPr lang="en-US"/>
           </a:p>
@@ -4172,418 +4171,11 @@
         <p:spPr/>
         <p:txBody>
           <a:bodyPr>
-            <a:normAutofit fontScale="77500" lnSpcReduction="20000"/>
+            <a:normAutofit/>
           </a:bodyPr>
           <a:lstStyle/>
           <a:p>
-            <a:r>
-              <a:rPr lang="en-US" sz="2000" dirty="0" smtClean="0"/>
-              <a:t>download Plasmodium </a:t>
-            </a:r>
-            <a:r>
-              <a:rPr lang="en-US" sz="2000" dirty="0" err="1" smtClean="0"/>
-              <a:t>falciparum</a:t>
-            </a:r>
-            <a:r>
-              <a:rPr lang="en-US" sz="2000" dirty="0" smtClean="0"/>
-              <a:t> reference genome</a:t>
-            </a:r>
-          </a:p>
-          <a:p>
-            <a:pPr lvl="1"/>
-            <a:r>
-              <a:rPr lang="en-US" sz="1200" dirty="0" smtClean="0"/>
-              <a:t>ftp </a:t>
-            </a:r>
-            <a:r>
-              <a:rPr lang="en-US" sz="1200" dirty="0" smtClean="0">
-                <a:hlinkClick r:id="rId2" action="ppaction://hlinkfile"/>
-              </a:rPr>
-              <a:t>ftp.ncbi.nih.gov</a:t>
-            </a:r>
-            <a:r>
-              <a:rPr lang="en-US" sz="1200" dirty="0" smtClean="0"/>
-              <a:t> (user anonymous, password your email)</a:t>
-            </a:r>
-          </a:p>
-          <a:p>
-            <a:pPr lvl="1"/>
-            <a:r>
-              <a:rPr lang="en-US" sz="1200" dirty="0" err="1" smtClean="0"/>
-              <a:t>cd</a:t>
-            </a:r>
-            <a:r>
-              <a:rPr lang="en-US" sz="1200" dirty="0" smtClean="0"/>
-              <a:t> genomes/</a:t>
-            </a:r>
-            <a:r>
-              <a:rPr lang="en-US" sz="1200" dirty="0" err="1" smtClean="0"/>
-              <a:t>Plasmodium_falciparum_OLD</a:t>
-            </a:r>
-            <a:endParaRPr lang="en-US" sz="1200" dirty="0" smtClean="0"/>
-          </a:p>
-          <a:p>
-            <a:pPr lvl="1"/>
-            <a:r>
-              <a:rPr lang="en-US" sz="1200" dirty="0" err="1" smtClean="0"/>
-              <a:t>ls</a:t>
-            </a:r>
-            <a:endParaRPr lang="en-US" sz="1200" dirty="0" smtClean="0"/>
-          </a:p>
-          <a:p>
-            <a:pPr lvl="1"/>
-            <a:r>
-              <a:rPr lang="en-US" sz="1200" dirty="0" err="1" smtClean="0"/>
-              <a:t>cd</a:t>
-            </a:r>
-            <a:r>
-              <a:rPr lang="en-US" sz="1200" dirty="0" smtClean="0"/>
-              <a:t> CHR1</a:t>
-            </a:r>
-          </a:p>
-          <a:p>
-            <a:pPr lvl="1"/>
-            <a:r>
-              <a:rPr lang="en-US" sz="1200" dirty="0" err="1" smtClean="0"/>
-              <a:t>ls</a:t>
-            </a:r>
-            <a:r>
-              <a:rPr lang="en-US" sz="1200" dirty="0" smtClean="0"/>
-              <a:t> *</a:t>
-            </a:r>
-            <a:r>
-              <a:rPr lang="en-US" sz="1200" dirty="0" err="1" smtClean="0"/>
-              <a:t>fna</a:t>
-            </a:r>
-            <a:endParaRPr lang="en-US" sz="1200" dirty="0" smtClean="0"/>
-          </a:p>
-          <a:p>
-            <a:pPr lvl="1"/>
-            <a:r>
-              <a:rPr lang="en-US" sz="1200" dirty="0" smtClean="0"/>
-              <a:t>copy/paste the </a:t>
-            </a:r>
-            <a:r>
-              <a:rPr lang="en-US" sz="1200" dirty="0" err="1" smtClean="0"/>
-              <a:t>fna</a:t>
-            </a:r>
-            <a:r>
-              <a:rPr lang="en-US" sz="1200" dirty="0" smtClean="0"/>
-              <a:t> filename into get FILENAME</a:t>
-            </a:r>
-          </a:p>
-          <a:p>
-            <a:pPr lvl="1"/>
-            <a:r>
-              <a:rPr lang="en-US" sz="1200" dirty="0" err="1" smtClean="0"/>
-              <a:t>cd</a:t>
-            </a:r>
-            <a:r>
-              <a:rPr lang="en-US" sz="1200" dirty="0" smtClean="0"/>
-              <a:t> ..</a:t>
-            </a:r>
-          </a:p>
-          <a:p>
-            <a:pPr lvl="1"/>
-            <a:r>
-              <a:rPr lang="en-US" sz="1200" dirty="0" smtClean="0"/>
-              <a:t>repeat for all other chromosomes</a:t>
-            </a:r>
-          </a:p>
-          <a:p>
-            <a:pPr lvl="1"/>
-            <a:r>
-              <a:rPr lang="en-US" sz="1200" dirty="0" smtClean="0"/>
-              <a:t>quit</a:t>
-            </a:r>
-          </a:p>
-          <a:p>
-            <a:pPr lvl="1"/>
-            <a:r>
-              <a:rPr lang="en-US" sz="1200" dirty="0" smtClean="0"/>
-              <a:t>cat *</a:t>
-            </a:r>
-            <a:r>
-              <a:rPr lang="en-US" sz="1200" dirty="0" err="1" smtClean="0"/>
-              <a:t>fna</a:t>
-            </a:r>
-            <a:r>
-              <a:rPr lang="en-US" sz="1200" dirty="0" smtClean="0"/>
-              <a:t> | </a:t>
-            </a:r>
-            <a:r>
-              <a:rPr lang="en-US" sz="1200" dirty="0" err="1" smtClean="0"/>
-              <a:t>perl</a:t>
-            </a:r>
-            <a:r>
-              <a:rPr lang="en-US" sz="1200" dirty="0" smtClean="0"/>
-              <a:t> -pi -</a:t>
-            </a:r>
-            <a:r>
-              <a:rPr lang="en-US" sz="1200" dirty="0" err="1" smtClean="0"/>
-              <a:t>e</a:t>
-            </a:r>
-            <a:r>
-              <a:rPr lang="en-US" sz="1200" dirty="0" smtClean="0"/>
-              <a:t> '</a:t>
-            </a:r>
-            <a:r>
-              <a:rPr lang="en-US" sz="1200" dirty="0" err="1" smtClean="0"/>
-              <a:t>s</a:t>
-            </a:r>
-            <a:r>
-              <a:rPr lang="en-US" sz="1200" dirty="0" smtClean="0"/>
-              <a:t>/^\&gt;</a:t>
-            </a:r>
-            <a:r>
-              <a:rPr lang="en-US" sz="1200" dirty="0" err="1" smtClean="0"/>
-              <a:t>gi</a:t>
-            </a:r>
-            <a:r>
-              <a:rPr lang="en-US" sz="1200" dirty="0" smtClean="0"/>
-              <a:t>.*chromosome\</a:t>
-            </a:r>
-            <a:r>
-              <a:rPr lang="en-US" sz="1200" dirty="0" err="1" smtClean="0"/>
-              <a:t>s(\d</a:t>
-            </a:r>
-            <a:r>
-              <a:rPr lang="en-US" sz="1200" dirty="0" smtClean="0"/>
-              <a:t>+).*/\&gt;chr$1/g' &gt;&gt; </a:t>
-            </a:r>
-            <a:r>
-              <a:rPr lang="en-US" sz="1200" dirty="0" err="1" smtClean="0"/>
-              <a:t>Plasmodium_falciparum_OLD.fa</a:t>
-            </a:r>
-            <a:endParaRPr lang="en-US" sz="1200" dirty="0" smtClean="0"/>
-          </a:p>
-          <a:p>
-            <a:pPr lvl="1"/>
-            <a:r>
-              <a:rPr lang="en-US" sz="1200" dirty="0" err="1" smtClean="0"/>
-              <a:t>rm</a:t>
-            </a:r>
-            <a:r>
-              <a:rPr lang="en-US" sz="1200" dirty="0" smtClean="0"/>
-              <a:t> *.</a:t>
-            </a:r>
-            <a:r>
-              <a:rPr lang="en-US" sz="1200" dirty="0" err="1" smtClean="0"/>
-              <a:t>fna</a:t>
-            </a:r>
-            <a:endParaRPr lang="en-US" sz="1200" dirty="0" smtClean="0"/>
-          </a:p>
-          <a:p>
-            <a:r>
-              <a:rPr lang="en-US" sz="2000" dirty="0" err="1" smtClean="0"/>
-              <a:t>bwa</a:t>
-            </a:r>
-            <a:r>
-              <a:rPr lang="en-US" sz="2000" dirty="0" smtClean="0"/>
-              <a:t> index </a:t>
-            </a:r>
-            <a:r>
-              <a:rPr lang="en-US" sz="2000" dirty="0" err="1" smtClean="0"/>
-              <a:t>Plasmodium_falciparu_OLD.fa</a:t>
-            </a:r>
-            <a:endParaRPr lang="en-US" sz="2000" dirty="0" smtClean="0"/>
-          </a:p>
-          <a:p>
-            <a:r>
-              <a:rPr lang="en-US" sz="2000" dirty="0" smtClean="0"/>
-              <a:t>download P. </a:t>
-            </a:r>
-            <a:r>
-              <a:rPr lang="en-US" sz="2000" dirty="0" err="1" smtClean="0"/>
-              <a:t>falciparum</a:t>
-            </a:r>
-            <a:r>
-              <a:rPr lang="en-US" sz="2000" dirty="0" smtClean="0"/>
-              <a:t> experiment Paired Sample raw </a:t>
-            </a:r>
-            <a:r>
-              <a:rPr lang="en-US" sz="2000" dirty="0" err="1" smtClean="0"/>
-              <a:t>fastq</a:t>
-            </a:r>
-            <a:r>
-              <a:rPr lang="en-US" sz="2000" dirty="0" smtClean="0"/>
-              <a:t> files</a:t>
-            </a:r>
-          </a:p>
-          <a:p>
-            <a:pPr lvl="1"/>
-            <a:r>
-              <a:rPr lang="en-US" sz="1400" dirty="0" smtClean="0"/>
-              <a:t>ftp </a:t>
-            </a:r>
-            <a:r>
-              <a:rPr lang="en-US" sz="1400" dirty="0" smtClean="0">
-                <a:hlinkClick r:id="rId3" action="ppaction://hlinkfile"/>
-              </a:rPr>
-              <a:t>ftp.sra.ebi.ac.uk</a:t>
-            </a:r>
-            <a:r>
-              <a:rPr lang="en-US" sz="1400" dirty="0" smtClean="0"/>
-              <a:t> (user anonymous, password your email)</a:t>
-            </a:r>
-          </a:p>
-          <a:p>
-            <a:pPr lvl="1"/>
-            <a:r>
-              <a:rPr lang="en-US" sz="1400" dirty="0" err="1" smtClean="0"/>
-              <a:t>cd</a:t>
-            </a:r>
-            <a:r>
-              <a:rPr lang="en-US" sz="1400" dirty="0" smtClean="0"/>
-              <a:t> vol1/fastq/ERR022/ERR022523</a:t>
-            </a:r>
-          </a:p>
-          <a:p>
-            <a:pPr lvl="1"/>
-            <a:r>
-              <a:rPr lang="en-US" sz="1400" dirty="0" smtClean="0"/>
-              <a:t>get ERR022523_1.fastq.gz</a:t>
-            </a:r>
-          </a:p>
-          <a:p>
-            <a:pPr lvl="1"/>
-            <a:r>
-              <a:rPr lang="en-US" sz="1400" dirty="0" smtClean="0"/>
-              <a:t>get ERR022523_2.fastq.gz</a:t>
-            </a:r>
-          </a:p>
-          <a:p>
-            <a:pPr lvl="1"/>
-            <a:r>
-              <a:rPr lang="en-US" sz="1400" dirty="0" smtClean="0"/>
-              <a:t>quit</a:t>
-            </a:r>
-          </a:p>
-          <a:p>
-            <a:pPr lvl="1"/>
-            <a:r>
-              <a:rPr lang="en-US" sz="1400" dirty="0" err="1" smtClean="0"/>
-              <a:t>gunzip</a:t>
-            </a:r>
-            <a:r>
-              <a:rPr lang="en-US" sz="1400" dirty="0" smtClean="0"/>
-              <a:t> ERR022523_1.fastq.gz</a:t>
-            </a:r>
-          </a:p>
-          <a:p>
-            <a:pPr lvl="1"/>
-            <a:r>
-              <a:rPr lang="en-US" sz="1400" dirty="0" err="1" smtClean="0"/>
-              <a:t>gunzip</a:t>
-            </a:r>
-            <a:r>
-              <a:rPr lang="en-US" sz="1400" dirty="0" smtClean="0"/>
-              <a:t> ERR022523_2.fastq.gz</a:t>
-            </a:r>
-          </a:p>
-          <a:p>
-            <a:r>
-              <a:rPr lang="en-US" sz="2000" dirty="0" smtClean="0"/>
-              <a:t>align ERR022523_1.fastq against </a:t>
-            </a:r>
-            <a:r>
-              <a:rPr lang="en-US" sz="2000" dirty="0" err="1" smtClean="0"/>
-              <a:t>Plasmodium_falciparum_OLD.fa</a:t>
-            </a:r>
-            <a:endParaRPr lang="en-US" sz="2000" dirty="0" smtClean="0"/>
-          </a:p>
-          <a:p>
-            <a:r>
-              <a:rPr lang="en-US" sz="2000" dirty="0" smtClean="0"/>
-              <a:t>align ERR022523_2.fastq against </a:t>
-            </a:r>
-            <a:r>
-              <a:rPr lang="en-US" sz="2000" dirty="0" err="1" smtClean="0"/>
-              <a:t>Plasmodium_falciparum_OLD.fa</a:t>
-            </a:r>
-            <a:endParaRPr lang="en-US" sz="2000" dirty="0" smtClean="0"/>
-          </a:p>
-          <a:p>
-            <a:r>
-              <a:rPr lang="en-US" sz="2000" dirty="0" smtClean="0"/>
-              <a:t>generate a sorted bam alignment output file</a:t>
-            </a:r>
             <a:endParaRPr lang="en-US" sz="2000" dirty="0"/>
-          </a:p>
-        </p:txBody>
-      </p:sp>
-    </p:spTree>
-  </p:cSld>
-  <p:clrMapOvr>
-    <a:masterClrMapping/>
-  </p:clrMapOvr>
-</p:sld>
-</file>
-
-<file path=ppt/slides/slide14.xml><?xml version="1.0" encoding="utf-8"?>
-<p:sld xmlns:a="http://schemas.openxmlformats.org/drawingml/2006/main" xmlns:r="http://schemas.openxmlformats.org/officeDocument/2006/relationships" xmlns:p="http://schemas.openxmlformats.org/presentationml/2006/main">
-  <p:cSld>
-    <p:spTree>
-      <p:nvGrpSpPr>
-        <p:cNvPr id="1" name=""/>
-        <p:cNvGrpSpPr/>
-        <p:nvPr/>
-      </p:nvGrpSpPr>
-      <p:grpSpPr>
-        <a:xfrm>
-          <a:off x="0" y="0"/>
-          <a:ext cx="0" cy="0"/>
-          <a:chOff x="0" y="0"/>
-          <a:chExt cx="0" cy="0"/>
-        </a:xfrm>
-      </p:grpSpPr>
-      <p:sp>
-        <p:nvSpPr>
-          <p:cNvPr id="2" name="Title 1"/>
-          <p:cNvSpPr>
-            <a:spLocks noGrp="1"/>
-          </p:cNvSpPr>
-          <p:nvPr>
-            <p:ph type="title"/>
-          </p:nvPr>
-        </p:nvSpPr>
-        <p:spPr/>
-        <p:txBody>
-          <a:bodyPr/>
-          <a:lstStyle/>
-          <a:p>
-            <a:r>
-              <a:rPr lang="en-US" dirty="0" smtClean="0"/>
-              <a:t>Scripting is easier</a:t>
-            </a:r>
-            <a:endParaRPr lang="en-US" dirty="0"/>
-          </a:p>
-        </p:txBody>
-      </p:sp>
-      <p:sp>
-        <p:nvSpPr>
-          <p:cNvPr id="3" name="Content Placeholder 2"/>
-          <p:cNvSpPr>
-            <a:spLocks noGrp="1"/>
-          </p:cNvSpPr>
-          <p:nvPr>
-            <p:ph idx="1"/>
-          </p:nvPr>
-        </p:nvSpPr>
-        <p:spPr/>
-        <p:txBody>
-          <a:bodyPr/>
-          <a:lstStyle/>
-          <a:p>
-            <a:r>
-              <a:rPr lang="en-US" dirty="0" err="1" smtClean="0"/>
-              <a:t>src</a:t>
-            </a:r>
-            <a:r>
-              <a:rPr lang="en-US" smtClean="0"/>
-              <a:t>/Plasmodium.sh</a:t>
-            </a:r>
-            <a:endParaRPr lang="en-US"/>
           </a:p>
         </p:txBody>
       </p:sp>
@@ -5805,7 +5397,15 @@
             </a:r>
             <a:r>
               <a:rPr lang="en-US" sz="2400" dirty="0" smtClean="0"/>
-              <a:t> sort automatically appends .bam to the string you provide in the second argument (this trips many people up when the see </a:t>
+              <a:t> sort automatically appends .bam to the string you provide in the second argument (this trips many people up when </a:t>
+            </a:r>
+            <a:r>
+              <a:rPr lang="en-US" sz="2400" dirty="0" smtClean="0"/>
+              <a:t>they </a:t>
+            </a:r>
+            <a:r>
+              <a:rPr lang="en-US" sz="2400" dirty="0" smtClean="0"/>
+              <a:t>see </a:t>
             </a:r>
             <a:r>
               <a:rPr lang="en-US" sz="2400" dirty="0" err="1" smtClean="0"/>

</xml_diff>